<commit_message>
update GLCD slides and with partially demo code
</commit_message>
<xml_diff>
--- a/Labs/Lab06-Graphics_LCD/Lab06-Graphics_LCD.pptx
+++ b/Labs/Lab06-Graphics_LCD/Lab06-Graphics_LCD.pptx
@@ -17,10 +17,12 @@
     <p:sldId id="262" r:id="rId11"/>
     <p:sldId id="264" r:id="rId12"/>
     <p:sldId id="282" r:id="rId13"/>
-    <p:sldId id="283" r:id="rId14"/>
-    <p:sldId id="279" r:id="rId15"/>
-    <p:sldId id="280" r:id="rId16"/>
-    <p:sldId id="281" r:id="rId17"/>
+    <p:sldId id="284" r:id="rId14"/>
+    <p:sldId id="283" r:id="rId15"/>
+    <p:sldId id="279" r:id="rId16"/>
+    <p:sldId id="280" r:id="rId17"/>
+    <p:sldId id="281" r:id="rId18"/>
+    <p:sldId id="285" r:id="rId19"/>
   </p:sldIdLst>
   <p:sldSz cx="9144000" cy="6858000" type="screen4x3"/>
   <p:notesSz cx="6858000" cy="9144000"/>
@@ -576,7 +578,7 @@
           <a:p>
             <a:fld id="{28320CCE-C547-4A70-B16F-104818F71F93}" type="datetimeFigureOut">
               <a:rPr lang="zh-TW" altLang="en-US" smtClean="0"/>
-              <a:t>2018/11/28</a:t>
+              <a:t>2018/12/11</a:t>
             </a:fld>
             <a:endParaRPr lang="zh-TW" altLang="en-US"/>
           </a:p>
@@ -780,7 +782,7 @@
           <a:p>
             <a:fld id="{28320CCE-C547-4A70-B16F-104818F71F93}" type="datetimeFigureOut">
               <a:rPr lang="zh-TW" altLang="en-US" smtClean="0"/>
-              <a:t>2018/11/28</a:t>
+              <a:t>2018/12/11</a:t>
             </a:fld>
             <a:endParaRPr lang="zh-TW" altLang="en-US"/>
           </a:p>
@@ -972,7 +974,7 @@
           <a:p>
             <a:fld id="{28320CCE-C547-4A70-B16F-104818F71F93}" type="datetimeFigureOut">
               <a:rPr lang="zh-TW" altLang="en-US" smtClean="0"/>
-              <a:t>2018/11/28</a:t>
+              <a:t>2018/12/11</a:t>
             </a:fld>
             <a:endParaRPr lang="zh-TW" altLang="en-US"/>
           </a:p>
@@ -1195,7 +1197,7 @@
           <a:p>
             <a:fld id="{28320CCE-C547-4A70-B16F-104818F71F93}" type="datetimeFigureOut">
               <a:rPr lang="zh-TW" altLang="en-US" smtClean="0"/>
-              <a:t>2018/11/28</a:t>
+              <a:t>2018/12/11</a:t>
             </a:fld>
             <a:endParaRPr lang="zh-TW" altLang="en-US"/>
           </a:p>
@@ -1405,7 +1407,7 @@
           <a:p>
             <a:fld id="{28320CCE-C547-4A70-B16F-104818F71F93}" type="datetimeFigureOut">
               <a:rPr lang="zh-TW" altLang="en-US" smtClean="0"/>
-              <a:t>2018/11/28</a:t>
+              <a:t>2018/12/11</a:t>
             </a:fld>
             <a:endParaRPr lang="zh-TW" altLang="en-US"/>
           </a:p>
@@ -1705,7 +1707,7 @@
           <a:p>
             <a:fld id="{28320CCE-C547-4A70-B16F-104818F71F93}" type="datetimeFigureOut">
               <a:rPr lang="zh-TW" altLang="en-US" smtClean="0"/>
-              <a:t>2018/11/28</a:t>
+              <a:t>2018/12/11</a:t>
             </a:fld>
             <a:endParaRPr lang="zh-TW" altLang="en-US"/>
           </a:p>
@@ -2144,7 +2146,7 @@
           <a:p>
             <a:fld id="{28320CCE-C547-4A70-B16F-104818F71F93}" type="datetimeFigureOut">
               <a:rPr lang="zh-TW" altLang="en-US" smtClean="0"/>
-              <a:t>2018/11/28</a:t>
+              <a:t>2018/12/11</a:t>
             </a:fld>
             <a:endParaRPr lang="zh-TW" altLang="en-US"/>
           </a:p>
@@ -2284,7 +2286,7 @@
           <a:p>
             <a:fld id="{28320CCE-C547-4A70-B16F-104818F71F93}" type="datetimeFigureOut">
               <a:rPr lang="zh-TW" altLang="en-US" smtClean="0"/>
-              <a:t>2018/11/28</a:t>
+              <a:t>2018/12/11</a:t>
             </a:fld>
             <a:endParaRPr lang="zh-TW" altLang="en-US"/>
           </a:p>
@@ -2397,7 +2399,7 @@
           <a:p>
             <a:fld id="{28320CCE-C547-4A70-B16F-104818F71F93}" type="datetimeFigureOut">
               <a:rPr lang="zh-TW" altLang="en-US" smtClean="0"/>
-              <a:t>2018/11/28</a:t>
+              <a:t>2018/12/11</a:t>
             </a:fld>
             <a:endParaRPr lang="zh-TW" altLang="en-US"/>
           </a:p>
@@ -2686,7 +2688,7 @@
           <a:p>
             <a:fld id="{28320CCE-C547-4A70-B16F-104818F71F93}" type="datetimeFigureOut">
               <a:rPr lang="zh-TW" altLang="en-US" smtClean="0"/>
-              <a:t>2018/11/28</a:t>
+              <a:t>2018/12/11</a:t>
             </a:fld>
             <a:endParaRPr lang="zh-TW" altLang="en-US"/>
           </a:p>
@@ -2955,7 +2957,7 @@
           <a:p>
             <a:fld id="{28320CCE-C547-4A70-B16F-104818F71F93}" type="datetimeFigureOut">
               <a:rPr lang="zh-TW" altLang="en-US" smtClean="0"/>
-              <a:t>2018/11/28</a:t>
+              <a:t>2018/12/11</a:t>
             </a:fld>
             <a:endParaRPr lang="zh-TW" altLang="en-US"/>
           </a:p>
@@ -3512,7 +3514,7 @@
           <a:p>
             <a:fld id="{28320CCE-C547-4A70-B16F-104818F71F93}" type="datetimeFigureOut">
               <a:rPr lang="zh-TW" altLang="en-US" smtClean="0"/>
-              <a:t>2018/11/28</a:t>
+              <a:t>2018/12/11</a:t>
             </a:fld>
             <a:endParaRPr lang="zh-TW" altLang="en-US"/>
           </a:p>
@@ -4158,6 +4160,13 @@
   <p:clrMapOvr>
     <a:masterClrMapping/>
   </p:clrMapOvr>
+  <p:timing>
+    <p:tnLst>
+      <p:par>
+        <p:cTn id="1" dur="indefinite" restart="never" nodeType="tmRoot"/>
+      </p:par>
+    </p:tnLst>
+  </p:timing>
 </p:sld>
 </file>
 
@@ -4637,7 +4646,7 @@
           <a:p>
             <a:r>
               <a:rPr lang="en-US" altLang="zh-TW" dirty="0" smtClean="0"/>
-              <a:t>Write a sequence of P2 and P4 value to test whether the GLCD is busy or not</a:t>
+              <a:t>Write a sequence of P2 and P4 value to reset and turn-on the graphics LCD</a:t>
             </a:r>
             <a:endParaRPr lang="zh-TW" altLang="en-US" dirty="0"/>
           </a:p>
@@ -4646,7 +4655,7 @@
     </p:spTree>
     <p:extLst>
       <p:ext uri="{BB962C8B-B14F-4D97-AF65-F5344CB8AC3E}">
-        <p14:creationId xmlns:p14="http://schemas.microsoft.com/office/powerpoint/2010/main" val="232953667"/>
+        <p14:creationId xmlns:p14="http://schemas.microsoft.com/office/powerpoint/2010/main" val="1583507902"/>
       </p:ext>
     </p:extLst>
   </p:cSld>
@@ -4713,7 +4722,7 @@
           <a:p>
             <a:r>
               <a:rPr lang="en-US" altLang="zh-TW" dirty="0" smtClean="0"/>
-              <a:t>Write the series of P2 and P4 value to set a bitmap 0xAF on address x=3, y=25</a:t>
+              <a:t>Write a sequence of P2 and P4 value to test whether the GLCD is busy or not</a:t>
             </a:r>
             <a:endParaRPr lang="zh-TW" altLang="en-US" dirty="0"/>
           </a:p>
@@ -4722,7 +4731,7 @@
     </p:spTree>
     <p:extLst>
       <p:ext uri="{BB962C8B-B14F-4D97-AF65-F5344CB8AC3E}">
-        <p14:creationId xmlns:p14="http://schemas.microsoft.com/office/powerpoint/2010/main" val="2408543064"/>
+        <p14:creationId xmlns:p14="http://schemas.microsoft.com/office/powerpoint/2010/main" val="232953667"/>
       </p:ext>
     </p:extLst>
   </p:cSld>
@@ -4758,12 +4767,12 @@
       </p:grpSpPr>
       <p:sp>
         <p:nvSpPr>
-          <p:cNvPr id="4" name="標題 3"/>
-          <p:cNvSpPr>
-            <a:spLocks noGrp="1"/>
-          </p:cNvSpPr>
-          <p:nvPr>
-            <p:ph type="ctrTitle"/>
+          <p:cNvPr id="2" name="標題 1"/>
+          <p:cNvSpPr>
+            <a:spLocks noGrp="1"/>
+          </p:cNvSpPr>
+          <p:nvPr>
+            <p:ph type="title"/>
           </p:nvPr>
         </p:nvSpPr>
         <p:spPr/>
@@ -4773,7 +4782,7 @@
           <a:p>
             <a:r>
               <a:rPr lang="en-US" altLang="zh-TW" dirty="0" smtClean="0"/>
-              <a:t>Pre-Lab Report</a:t>
+              <a:t>In-Class Exercise</a:t>
             </a:r>
             <a:endParaRPr lang="zh-TW" altLang="en-US" dirty="0"/>
           </a:p>
@@ -4781,12 +4790,12 @@
       </p:sp>
       <p:sp>
         <p:nvSpPr>
-          <p:cNvPr id="5" name="副標題 4"/>
-          <p:cNvSpPr>
-            <a:spLocks noGrp="1"/>
-          </p:cNvSpPr>
-          <p:nvPr>
-            <p:ph type="subTitle" idx="1"/>
+          <p:cNvPr id="3" name="內容版面配置區 2"/>
+          <p:cNvSpPr>
+            <a:spLocks noGrp="1"/>
+          </p:cNvSpPr>
+          <p:nvPr>
+            <p:ph idx="1"/>
           </p:nvPr>
         </p:nvSpPr>
         <p:spPr/>
@@ -4794,14 +4803,18 @@
           <a:bodyPr/>
           <a:lstStyle/>
           <a:p>
-            <a:endParaRPr lang="zh-TW" altLang="en-US"/>
+            <a:r>
+              <a:rPr lang="en-US" altLang="zh-TW" dirty="0" smtClean="0"/>
+              <a:t>Write the series of P2 and P4 value to set a bitmap 0xAF on address x=3, y=25</a:t>
+            </a:r>
+            <a:endParaRPr lang="zh-TW" altLang="en-US" dirty="0"/>
           </a:p>
         </p:txBody>
       </p:sp>
     </p:spTree>
     <p:extLst>
       <p:ext uri="{BB962C8B-B14F-4D97-AF65-F5344CB8AC3E}">
-        <p14:creationId xmlns:p14="http://schemas.microsoft.com/office/powerpoint/2010/main" val="373517141"/>
+        <p14:creationId xmlns:p14="http://schemas.microsoft.com/office/powerpoint/2010/main" val="2408543064"/>
       </p:ext>
     </p:extLst>
   </p:cSld>
@@ -4837,6 +4850,85 @@
       </p:grpSpPr>
       <p:sp>
         <p:nvSpPr>
+          <p:cNvPr id="4" name="標題 3"/>
+          <p:cNvSpPr>
+            <a:spLocks noGrp="1"/>
+          </p:cNvSpPr>
+          <p:nvPr>
+            <p:ph type="ctrTitle"/>
+          </p:nvPr>
+        </p:nvSpPr>
+        <p:spPr/>
+        <p:txBody>
+          <a:bodyPr/>
+          <a:lstStyle/>
+          <a:p>
+            <a:r>
+              <a:rPr lang="en-US" altLang="zh-TW" dirty="0" smtClean="0"/>
+              <a:t>Pre-Lab Report</a:t>
+            </a:r>
+            <a:endParaRPr lang="zh-TW" altLang="en-US" dirty="0"/>
+          </a:p>
+        </p:txBody>
+      </p:sp>
+      <p:sp>
+        <p:nvSpPr>
+          <p:cNvPr id="5" name="副標題 4"/>
+          <p:cNvSpPr>
+            <a:spLocks noGrp="1"/>
+          </p:cNvSpPr>
+          <p:nvPr>
+            <p:ph type="subTitle" idx="1"/>
+          </p:nvPr>
+        </p:nvSpPr>
+        <p:spPr/>
+        <p:txBody>
+          <a:bodyPr/>
+          <a:lstStyle/>
+          <a:p>
+            <a:endParaRPr lang="zh-TW" altLang="en-US"/>
+          </a:p>
+        </p:txBody>
+      </p:sp>
+    </p:spTree>
+    <p:extLst>
+      <p:ext uri="{BB962C8B-B14F-4D97-AF65-F5344CB8AC3E}">
+        <p14:creationId xmlns:p14="http://schemas.microsoft.com/office/powerpoint/2010/main" val="373517141"/>
+      </p:ext>
+    </p:extLst>
+  </p:cSld>
+  <p:clrMapOvr>
+    <a:masterClrMapping/>
+  </p:clrMapOvr>
+  <p:timing>
+    <p:tnLst>
+      <p:par>
+        <p:cTn id="1" dur="indefinite" restart="never" nodeType="tmRoot"/>
+      </p:par>
+    </p:tnLst>
+  </p:timing>
+</p:sld>
+</file>
+
+<file path=ppt/slides/slide17.xml><?xml version="1.0" encoding="utf-8"?>
+<p:sld xmlns:a="http://schemas.openxmlformats.org/drawingml/2006/main" xmlns:r="http://schemas.openxmlformats.org/officeDocument/2006/relationships" xmlns:p="http://schemas.openxmlformats.org/presentationml/2006/main">
+  <p:cSld>
+    <p:spTree>
+      <p:nvGrpSpPr>
+        <p:cNvPr id="1" name=""/>
+        <p:cNvGrpSpPr/>
+        <p:nvPr/>
+      </p:nvGrpSpPr>
+      <p:grpSpPr>
+        <a:xfrm>
+          <a:off x="0" y="0"/>
+          <a:ext cx="0" cy="0"/>
+          <a:chOff x="0" y="0"/>
+          <a:chExt cx="0" cy="0"/>
+        </a:xfrm>
+      </p:grpSpPr>
+      <p:sp>
+        <p:nvSpPr>
           <p:cNvPr id="2" name="標題 1"/>
           <p:cNvSpPr>
             <a:spLocks noGrp="1"/>
@@ -4924,6 +5016,116 @@
       </p:par>
     </p:tnLst>
   </p:timing>
+</p:sld>
+</file>
+
+<file path=ppt/slides/slide18.xml><?xml version="1.0" encoding="utf-8"?>
+<p:sld xmlns:a="http://schemas.openxmlformats.org/drawingml/2006/main" xmlns:r="http://schemas.openxmlformats.org/officeDocument/2006/relationships" xmlns:p="http://schemas.openxmlformats.org/presentationml/2006/main">
+  <p:cSld>
+    <p:spTree>
+      <p:nvGrpSpPr>
+        <p:cNvPr id="1" name=""/>
+        <p:cNvGrpSpPr/>
+        <p:nvPr/>
+      </p:nvGrpSpPr>
+      <p:grpSpPr>
+        <a:xfrm>
+          <a:off x="0" y="0"/>
+          <a:ext cx="0" cy="0"/>
+          <a:chOff x="0" y="0"/>
+          <a:chExt cx="0" cy="0"/>
+        </a:xfrm>
+      </p:grpSpPr>
+      <p:sp>
+        <p:nvSpPr>
+          <p:cNvPr id="2" name="標題 1"/>
+          <p:cNvSpPr>
+            <a:spLocks noGrp="1"/>
+          </p:cNvSpPr>
+          <p:nvPr>
+            <p:ph type="title"/>
+          </p:nvPr>
+        </p:nvSpPr>
+        <p:spPr/>
+        <p:txBody>
+          <a:bodyPr/>
+          <a:lstStyle/>
+          <a:p>
+            <a:r>
+              <a:rPr lang="en-US" altLang="zh-TW" dirty="0" smtClean="0"/>
+              <a:t>Demo before you leave today</a:t>
+            </a:r>
+            <a:endParaRPr lang="zh-TW" altLang="en-US" dirty="0"/>
+          </a:p>
+        </p:txBody>
+      </p:sp>
+      <p:sp>
+        <p:nvSpPr>
+          <p:cNvPr id="3" name="內容版面配置區 2"/>
+          <p:cNvSpPr>
+            <a:spLocks noGrp="1"/>
+          </p:cNvSpPr>
+          <p:nvPr>
+            <p:ph idx="1"/>
+          </p:nvPr>
+        </p:nvSpPr>
+        <p:spPr/>
+        <p:txBody>
+          <a:bodyPr/>
+          <a:lstStyle/>
+          <a:p>
+            <a:r>
+              <a:rPr lang="en-US" altLang="zh-TW" dirty="0" smtClean="0"/>
+              <a:t>Use the </a:t>
+            </a:r>
+            <a:r>
+              <a:rPr lang="en-US" altLang="zh-TW" dirty="0" err="1" smtClean="0"/>
+              <a:t>SiliconLab</a:t>
+            </a:r>
+            <a:r>
+              <a:rPr lang="en-US" altLang="zh-TW" dirty="0" smtClean="0"/>
+              <a:t> IDE to </a:t>
+            </a:r>
+            <a:r>
+              <a:rPr lang="en-US" altLang="zh-TW" dirty="0" smtClean="0">
+                <a:solidFill>
+                  <a:srgbClr val="FF0000"/>
+                </a:solidFill>
+              </a:rPr>
+              <a:t>manually</a:t>
+            </a:r>
+            <a:r>
+              <a:rPr lang="en-US" altLang="zh-TW" dirty="0" smtClean="0"/>
+              <a:t> draw some still image on the GLCD screen</a:t>
+            </a:r>
+          </a:p>
+          <a:p>
+            <a:pPr lvl="1"/>
+            <a:r>
+              <a:rPr lang="en-US" altLang="zh-TW" dirty="0" smtClean="0"/>
+              <a:t>Key-in the value of P2 and P4 manually</a:t>
+            </a:r>
+          </a:p>
+          <a:p>
+            <a:pPr lvl="1"/>
+            <a:r>
+              <a:rPr lang="en-US" altLang="zh-TW" dirty="0" smtClean="0"/>
+              <a:t>You have only sample code for basic setup</a:t>
+            </a:r>
+            <a:endParaRPr lang="zh-TW" altLang="en-US" dirty="0"/>
+          </a:p>
+        </p:txBody>
+      </p:sp>
+    </p:spTree>
+    <p:extLst>
+      <p:ext uri="{BB962C8B-B14F-4D97-AF65-F5344CB8AC3E}">
+        <p14:creationId xmlns:p14="http://schemas.microsoft.com/office/powerpoint/2010/main" val="3194074624"/>
+      </p:ext>
+    </p:extLst>
+  </p:cSld>
+  <p:clrMapOvr>
+    <a:masterClrMapping/>
+  </p:clrMapOvr>
 </p:sld>
 </file>
 

</xml_diff>

<commit_message>
upload revised slides on Lab 06: graphics LCD
</commit_message>
<xml_diff>
--- a/Labs/Lab06-Graphics_LCD/Lab06-Graphics_LCD.pptx
+++ b/Labs/Lab06-Graphics_LCD/Lab06-Graphics_LCD.pptx
@@ -578,7 +578,7 @@
           <a:p>
             <a:fld id="{28320CCE-C547-4A70-B16F-104818F71F93}" type="datetimeFigureOut">
               <a:rPr lang="zh-TW" altLang="en-US" smtClean="0"/>
-              <a:t>2018/12/11</a:t>
+              <a:t>2018/12/13</a:t>
             </a:fld>
             <a:endParaRPr lang="zh-TW" altLang="en-US"/>
           </a:p>
@@ -782,7 +782,7 @@
           <a:p>
             <a:fld id="{28320CCE-C547-4A70-B16F-104818F71F93}" type="datetimeFigureOut">
               <a:rPr lang="zh-TW" altLang="en-US" smtClean="0"/>
-              <a:t>2018/12/11</a:t>
+              <a:t>2018/12/13</a:t>
             </a:fld>
             <a:endParaRPr lang="zh-TW" altLang="en-US"/>
           </a:p>
@@ -974,7 +974,7 @@
           <a:p>
             <a:fld id="{28320CCE-C547-4A70-B16F-104818F71F93}" type="datetimeFigureOut">
               <a:rPr lang="zh-TW" altLang="en-US" smtClean="0"/>
-              <a:t>2018/12/11</a:t>
+              <a:t>2018/12/13</a:t>
             </a:fld>
             <a:endParaRPr lang="zh-TW" altLang="en-US"/>
           </a:p>
@@ -1197,7 +1197,7 @@
           <a:p>
             <a:fld id="{28320CCE-C547-4A70-B16F-104818F71F93}" type="datetimeFigureOut">
               <a:rPr lang="zh-TW" altLang="en-US" smtClean="0"/>
-              <a:t>2018/12/11</a:t>
+              <a:t>2018/12/13</a:t>
             </a:fld>
             <a:endParaRPr lang="zh-TW" altLang="en-US"/>
           </a:p>
@@ -1407,7 +1407,7 @@
           <a:p>
             <a:fld id="{28320CCE-C547-4A70-B16F-104818F71F93}" type="datetimeFigureOut">
               <a:rPr lang="zh-TW" altLang="en-US" smtClean="0"/>
-              <a:t>2018/12/11</a:t>
+              <a:t>2018/12/13</a:t>
             </a:fld>
             <a:endParaRPr lang="zh-TW" altLang="en-US"/>
           </a:p>
@@ -1707,7 +1707,7 @@
           <a:p>
             <a:fld id="{28320CCE-C547-4A70-B16F-104818F71F93}" type="datetimeFigureOut">
               <a:rPr lang="zh-TW" altLang="en-US" smtClean="0"/>
-              <a:t>2018/12/11</a:t>
+              <a:t>2018/12/13</a:t>
             </a:fld>
             <a:endParaRPr lang="zh-TW" altLang="en-US"/>
           </a:p>
@@ -2146,7 +2146,7 @@
           <a:p>
             <a:fld id="{28320CCE-C547-4A70-B16F-104818F71F93}" type="datetimeFigureOut">
               <a:rPr lang="zh-TW" altLang="en-US" smtClean="0"/>
-              <a:t>2018/12/11</a:t>
+              <a:t>2018/12/13</a:t>
             </a:fld>
             <a:endParaRPr lang="zh-TW" altLang="en-US"/>
           </a:p>
@@ -2286,7 +2286,7 @@
           <a:p>
             <a:fld id="{28320CCE-C547-4A70-B16F-104818F71F93}" type="datetimeFigureOut">
               <a:rPr lang="zh-TW" altLang="en-US" smtClean="0"/>
-              <a:t>2018/12/11</a:t>
+              <a:t>2018/12/13</a:t>
             </a:fld>
             <a:endParaRPr lang="zh-TW" altLang="en-US"/>
           </a:p>
@@ -2399,7 +2399,7 @@
           <a:p>
             <a:fld id="{28320CCE-C547-4A70-B16F-104818F71F93}" type="datetimeFigureOut">
               <a:rPr lang="zh-TW" altLang="en-US" smtClean="0"/>
-              <a:t>2018/12/11</a:t>
+              <a:t>2018/12/13</a:t>
             </a:fld>
             <a:endParaRPr lang="zh-TW" altLang="en-US"/>
           </a:p>
@@ -2688,7 +2688,7 @@
           <a:p>
             <a:fld id="{28320CCE-C547-4A70-B16F-104818F71F93}" type="datetimeFigureOut">
               <a:rPr lang="zh-TW" altLang="en-US" smtClean="0"/>
-              <a:t>2018/12/11</a:t>
+              <a:t>2018/12/13</a:t>
             </a:fld>
             <a:endParaRPr lang="zh-TW" altLang="en-US"/>
           </a:p>
@@ -2957,7 +2957,7 @@
           <a:p>
             <a:fld id="{28320CCE-C547-4A70-B16F-104818F71F93}" type="datetimeFigureOut">
               <a:rPr lang="zh-TW" altLang="en-US" smtClean="0"/>
-              <a:t>2018/12/11</a:t>
+              <a:t>2018/12/13</a:t>
             </a:fld>
             <a:endParaRPr lang="zh-TW" altLang="en-US"/>
           </a:p>
@@ -3514,7 +3514,7 @@
           <a:p>
             <a:fld id="{28320CCE-C547-4A70-B16F-104818F71F93}" type="datetimeFigureOut">
               <a:rPr lang="zh-TW" altLang="en-US" smtClean="0"/>
-              <a:t>2018/12/11</a:t>
+              <a:t>2018/12/13</a:t>
             </a:fld>
             <a:endParaRPr lang="zh-TW" altLang="en-US"/>
           </a:p>
@@ -4662,6 +4662,13 @@
   <p:clrMapOvr>
     <a:masterClrMapping/>
   </p:clrMapOvr>
+  <p:timing>
+    <p:tnLst>
+      <p:par>
+        <p:cTn id="1" dur="indefinite" restart="never" nodeType="tmRoot"/>
+      </p:par>
+    </p:tnLst>
+  </p:timing>
 </p:sld>
 </file>
 
@@ -5053,7 +5060,11 @@
           <a:p>
             <a:r>
               <a:rPr lang="en-US" altLang="zh-TW" dirty="0" smtClean="0"/>
-              <a:t>Demo before you leave today</a:t>
+              <a:t>Suggestion: do this </a:t>
+            </a:r>
+            <a:r>
+              <a:rPr lang="en-US" altLang="zh-TW" dirty="0" smtClean="0"/>
+              <a:t>before you leave today</a:t>
             </a:r>
             <a:endParaRPr lang="zh-TW" altLang="en-US" dirty="0"/>
           </a:p>
@@ -5126,6 +5137,13 @@
   <p:clrMapOvr>
     <a:masterClrMapping/>
   </p:clrMapOvr>
+  <p:timing>
+    <p:tnLst>
+      <p:par>
+        <p:cTn id="1" dur="indefinite" restart="never" nodeType="tmRoot"/>
+      </p:par>
+    </p:tnLst>
+  </p:timing>
 </p:sld>
 </file>
 

</xml_diff>